<commit_message>
Hira 100 jobily SAMPATI fixes
</commit_message>
<xml_diff>
--- a/Hira samihafa/Hira Jobily faha 100 taona ny SAMPATI.pptx
+++ b/Hira samihafa/Hira Jobily faha 100 taona ny SAMPATI.pptx
@@ -11,13 +11,15 @@
     <p:sldId id="259" r:id="rId5"/>
     <p:sldId id="260" r:id="rId6"/>
     <p:sldId id="267" r:id="rId7"/>
-    <p:sldId id="269" r:id="rId8"/>
+    <p:sldId id="272" r:id="rId8"/>
     <p:sldId id="262" r:id="rId9"/>
     <p:sldId id="270" r:id="rId10"/>
     <p:sldId id="268" r:id="rId11"/>
-    <p:sldId id="263" r:id="rId12"/>
+    <p:sldId id="273" r:id="rId12"/>
     <p:sldId id="265" r:id="rId13"/>
     <p:sldId id="266" r:id="rId14"/>
+    <p:sldId id="274" r:id="rId15"/>
+    <p:sldId id="275" r:id="rId16"/>
   </p:sldIdLst>
   <p:sldSz cx="12192000" cy="6858000"/>
   <p:notesSz cx="6858000" cy="9144000"/>
@@ -116,6 +118,11 @@
       </a:defRPr>
     </a:lvl9pPr>
   </p:defaultTextStyle>
+  <p:extLst>
+    <p:ext uri="{EFAFB233-063F-42B5-8137-9DF3F51BA10A}">
+      <p15:sldGuideLst xmlns:p15="http://schemas.microsoft.com/office/powerpoint/2012/main"/>
+    </p:ext>
+  </p:extLst>
 </p:presentation>
 </file>
 
@@ -3692,6 +3699,13 @@
   <p:clrMapOvr>
     <a:masterClrMapping/>
   </p:clrMapOvr>
+  <p:timing>
+    <p:tnLst>
+      <p:par>
+        <p:cTn id="1" dur="indefinite" restart="never" nodeType="tmRoot"/>
+      </p:par>
+    </p:tnLst>
+  </p:timing>
 </p:sld>
 </file>
 
@@ -3771,7 +3785,7 @@
                 </a:effectLst>
                 <a:latin typeface="Bell MT" panose="02020503060305020303" pitchFamily="18" charset="0"/>
               </a:rPr>
-              <a:t>tantanonao</a:t>
+              <a:t>mandehana</a:t>
             </a:r>
             <a:r>
               <a:rPr lang="fr-FR" sz="9600" b="1" dirty="0" smtClean="0">
@@ -3784,7 +3798,7 @@
                 </a:effectLst>
                 <a:latin typeface="Bell MT" panose="02020503060305020303" pitchFamily="18" charset="0"/>
               </a:rPr>
-              <a:t>, </a:t>
+              <a:t> </a:t>
             </a:r>
             <a:r>
               <a:rPr lang="fr-FR" sz="9600" b="1" dirty="0" err="1" smtClean="0">
@@ -3797,7 +3811,7 @@
                 </a:effectLst>
                 <a:latin typeface="Bell MT" panose="02020503060305020303" pitchFamily="18" charset="0"/>
               </a:rPr>
-              <a:t>arovinao</a:t>
+              <a:t>amin’izao</a:t>
             </a:r>
             <a:r>
               <a:rPr lang="fr-FR" sz="9600" b="1" dirty="0" smtClean="0">
@@ -3823,6 +3837,84 @@
                 </a:effectLst>
                 <a:latin typeface="Bell MT" panose="02020503060305020303" pitchFamily="18" charset="0"/>
               </a:rPr>
+              <a:t>herinao</a:t>
+            </a:r>
+            <a:r>
+              <a:rPr lang="fr-FR" sz="9600" b="1" dirty="0" smtClean="0">
+                <a:effectLst>
+                  <a:outerShdw blurRad="38100" dist="38100" dir="2700000" algn="tl">
+                    <a:srgbClr val="000000">
+                      <a:alpha val="43137"/>
+                    </a:srgbClr>
+                  </a:outerShdw>
+                </a:effectLst>
+                <a:latin typeface="Bell MT" panose="02020503060305020303" pitchFamily="18" charset="0"/>
+              </a:rPr>
+              <a:t> </a:t>
+            </a:r>
+            <a:r>
+              <a:rPr lang="fr-FR" sz="9600" b="1" dirty="0" err="1" smtClean="0">
+                <a:effectLst>
+                  <a:outerShdw blurRad="38100" dist="38100" dir="2700000" algn="tl">
+                    <a:srgbClr val="000000">
+                      <a:alpha val="43137"/>
+                    </a:srgbClr>
+                  </a:outerShdw>
+                </a:effectLst>
+                <a:latin typeface="Bell MT" panose="02020503060305020303" pitchFamily="18" charset="0"/>
+              </a:rPr>
+              <a:t>izao</a:t>
+            </a:r>
+            <a:endParaRPr lang="fr-FR" sz="9600" b="1" dirty="0" smtClean="0">
+              <a:effectLst>
+                <a:outerShdw blurRad="38100" dist="38100" dir="2700000" algn="tl">
+                  <a:srgbClr val="000000">
+                    <a:alpha val="43137"/>
+                  </a:srgbClr>
+                </a:outerShdw>
+              </a:effectLst>
+              <a:latin typeface="Bell MT" panose="02020503060305020303" pitchFamily="18" charset="0"/>
+            </a:endParaRPr>
+          </a:p>
+          <a:p>
+            <a:pPr algn="ctr"/>
+            <a:r>
+              <a:rPr lang="fr-FR" sz="9600" b="1" dirty="0" err="1" smtClean="0">
+                <a:effectLst>
+                  <a:outerShdw blurRad="38100" dist="38100" dir="2700000" algn="tl">
+                    <a:srgbClr val="000000">
+                      <a:alpha val="43137"/>
+                    </a:srgbClr>
+                  </a:outerShdw>
+                </a:effectLst>
+                <a:latin typeface="Bell MT" panose="02020503060305020303" pitchFamily="18" charset="0"/>
+              </a:rPr>
+              <a:t>Tanteraho</a:t>
+            </a:r>
+            <a:r>
+              <a:rPr lang="fr-FR" sz="9600" b="1" dirty="0" smtClean="0">
+                <a:effectLst>
+                  <a:outerShdw blurRad="38100" dist="38100" dir="2700000" algn="tl">
+                    <a:srgbClr val="000000">
+                      <a:alpha val="43137"/>
+                    </a:srgbClr>
+                  </a:outerShdw>
+                </a:effectLst>
+                <a:latin typeface="Bell MT" panose="02020503060305020303" pitchFamily="18" charset="0"/>
+              </a:rPr>
+              <a:t> </a:t>
+            </a:r>
+            <a:r>
+              <a:rPr lang="fr-FR" sz="9600" b="1" dirty="0" err="1" smtClean="0">
+                <a:effectLst>
+                  <a:outerShdw blurRad="38100" dist="38100" dir="2700000" algn="tl">
+                    <a:srgbClr val="000000">
+                      <a:alpha val="43137"/>
+                    </a:srgbClr>
+                  </a:outerShdw>
+                </a:effectLst>
+                <a:latin typeface="Bell MT" panose="02020503060305020303" pitchFamily="18" charset="0"/>
+              </a:rPr>
               <a:t>ny</a:t>
             </a:r>
             <a:r>
@@ -3836,11 +3928,8 @@
                 </a:effectLst>
                 <a:latin typeface="Bell MT" panose="02020503060305020303" pitchFamily="18" charset="0"/>
               </a:rPr>
-              <a:t> dia</a:t>
-            </a:r>
-          </a:p>
-          <a:p>
-            <a:pPr algn="ctr"/>
+              <a:t> </a:t>
+            </a:r>
             <a:r>
               <a:rPr lang="fr-FR" sz="9600" b="1" dirty="0" err="1" smtClean="0">
                 <a:effectLst>
@@ -3852,111 +3941,7 @@
                 </a:effectLst>
                 <a:latin typeface="Bell MT" panose="02020503060305020303" pitchFamily="18" charset="0"/>
               </a:rPr>
-              <a:t>Arovinao</a:t>
-            </a:r>
-            <a:r>
-              <a:rPr lang="fr-FR" sz="9600" b="1" dirty="0" smtClean="0">
-                <a:effectLst>
-                  <a:outerShdw blurRad="38100" dist="38100" dir="2700000" algn="tl">
-                    <a:srgbClr val="000000">
-                      <a:alpha val="43137"/>
-                    </a:srgbClr>
-                  </a:outerShdw>
-                </a:effectLst>
-                <a:latin typeface="Bell MT" panose="02020503060305020303" pitchFamily="18" charset="0"/>
-              </a:rPr>
-              <a:t> </a:t>
-            </a:r>
-            <a:r>
-              <a:rPr lang="fr-FR" sz="9600" b="1" dirty="0" err="1" smtClean="0">
-                <a:effectLst>
-                  <a:outerShdw blurRad="38100" dist="38100" dir="2700000" algn="tl">
-                    <a:srgbClr val="000000">
-                      <a:alpha val="43137"/>
-                    </a:srgbClr>
-                  </a:outerShdw>
-                </a:effectLst>
-                <a:latin typeface="Bell MT" panose="02020503060305020303" pitchFamily="18" charset="0"/>
-              </a:rPr>
-              <a:t>izahay</a:t>
-            </a:r>
-            <a:r>
-              <a:rPr lang="fr-FR" sz="9600" b="1" dirty="0" smtClean="0">
-                <a:effectLst>
-                  <a:outerShdw blurRad="38100" dist="38100" dir="2700000" algn="tl">
-                    <a:srgbClr val="000000">
-                      <a:alpha val="43137"/>
-                    </a:srgbClr>
-                  </a:outerShdw>
-                </a:effectLst>
-                <a:latin typeface="Bell MT" panose="02020503060305020303" pitchFamily="18" charset="0"/>
-              </a:rPr>
-              <a:t> </a:t>
-            </a:r>
-            <a:r>
-              <a:rPr lang="fr-FR" sz="9600" b="1" dirty="0" err="1" smtClean="0">
-                <a:effectLst>
-                  <a:outerShdw blurRad="38100" dist="38100" dir="2700000" algn="tl">
-                    <a:srgbClr val="000000">
-                      <a:alpha val="43137"/>
-                    </a:srgbClr>
-                  </a:outerShdw>
-                </a:effectLst>
-                <a:latin typeface="Bell MT" panose="02020503060305020303" pitchFamily="18" charset="0"/>
-              </a:rPr>
-              <a:t>Jesoa</a:t>
-            </a:r>
-            <a:r>
-              <a:rPr lang="fr-FR" sz="9600" b="1" dirty="0" smtClean="0">
-                <a:effectLst>
-                  <a:outerShdw blurRad="38100" dist="38100" dir="2700000" algn="tl">
-                    <a:srgbClr val="000000">
-                      <a:alpha val="43137"/>
-                    </a:srgbClr>
-                  </a:outerShdw>
-                </a:effectLst>
-                <a:latin typeface="Bell MT" panose="02020503060305020303" pitchFamily="18" charset="0"/>
-              </a:rPr>
-              <a:t> </a:t>
-            </a:r>
-            <a:r>
-              <a:rPr lang="fr-FR" sz="9600" b="1" dirty="0" err="1" smtClean="0">
-                <a:effectLst>
-                  <a:outerShdw blurRad="38100" dist="38100" dir="2700000" algn="tl">
-                    <a:srgbClr val="000000">
-                      <a:alpha val="43137"/>
-                    </a:srgbClr>
-                  </a:outerShdw>
-                </a:effectLst>
-                <a:latin typeface="Bell MT" panose="02020503060305020303" pitchFamily="18" charset="0"/>
-              </a:rPr>
-              <a:t>zoky</a:t>
-            </a:r>
-            <a:r>
-              <a:rPr lang="fr-FR" sz="9600" b="1" dirty="0" smtClean="0">
-                <a:effectLst>
-                  <a:outerShdw blurRad="38100" dist="38100" dir="2700000" algn="tl">
-                    <a:srgbClr val="000000">
-                      <a:alpha val="43137"/>
-                    </a:srgbClr>
-                  </a:outerShdw>
-                </a:effectLst>
-                <a:latin typeface="Bell MT" panose="02020503060305020303" pitchFamily="18" charset="0"/>
-              </a:rPr>
-              <a:t> </a:t>
-            </a:r>
-            <a:r>
-              <a:rPr lang="fr-FR" sz="9600" b="1" dirty="0" err="1" smtClean="0">
-                <a:effectLst>
-                  <a:outerShdw blurRad="38100" dist="38100" dir="2700000" algn="tl">
-                    <a:srgbClr val="000000">
-                      <a:alpha val="43137"/>
-                    </a:srgbClr>
-                  </a:outerShdw>
-                </a:effectLst>
-                <a:latin typeface="Bell MT" panose="02020503060305020303" pitchFamily="18" charset="0"/>
-              </a:rPr>
-              <a:t>tia</a:t>
+              <a:t>fanompoanao</a:t>
             </a:r>
             <a:endParaRPr lang="fr-FR" sz="9600" b="1" dirty="0">
               <a:effectLst>
@@ -3974,13 +3959,20 @@
     </p:spTree>
     <p:extLst>
       <p:ext uri="{BB962C8B-B14F-4D97-AF65-F5344CB8AC3E}">
-        <p14:creationId xmlns:p14="http://schemas.microsoft.com/office/powerpoint/2010/main" val="2509741012"/>
+        <p14:creationId xmlns:p14="http://schemas.microsoft.com/office/powerpoint/2010/main" val="2418498041"/>
       </p:ext>
     </p:extLst>
   </p:cSld>
   <p:clrMapOvr>
     <a:masterClrMapping/>
   </p:clrMapOvr>
+  <p:timing>
+    <p:tnLst>
+      <p:par>
+        <p:cTn id="1" dur="indefinite" restart="never" nodeType="tmRoot"/>
+      </p:par>
+    </p:tnLst>
+  </p:timing>
 </p:sld>
 </file>
 
@@ -4568,6 +4560,590 @@
 </p:sld>
 </file>
 
+<file path=ppt/slides/slide14.xml><?xml version="1.0" encoding="utf-8"?>
+<p:sld xmlns:a="http://schemas.openxmlformats.org/drawingml/2006/main" xmlns:r="http://schemas.openxmlformats.org/officeDocument/2006/relationships" xmlns:p="http://schemas.openxmlformats.org/presentationml/2006/main">
+  <p:cSld>
+    <p:spTree>
+      <p:nvGrpSpPr>
+        <p:cNvPr id="1" name=""/>
+        <p:cNvGrpSpPr/>
+        <p:nvPr/>
+      </p:nvGrpSpPr>
+      <p:grpSpPr>
+        <a:xfrm>
+          <a:off x="0" y="0"/>
+          <a:ext cx="0" cy="0"/>
+          <a:chOff x="0" y="0"/>
+          <a:chExt cx="0" cy="0"/>
+        </a:xfrm>
+      </p:grpSpPr>
+      <p:sp>
+        <p:nvSpPr>
+          <p:cNvPr id="2" name="Rectangle 1"/>
+          <p:cNvSpPr/>
+          <p:nvPr/>
+        </p:nvSpPr>
+        <p:spPr>
+          <a:xfrm>
+            <a:off x="0" y="232014"/>
+            <a:ext cx="12192000" cy="6001643"/>
+          </a:xfrm>
+          <a:prstGeom prst="rect">
+            <a:avLst/>
+          </a:prstGeom>
+        </p:spPr>
+        <p:txBody>
+          <a:bodyPr wrap="square">
+            <a:spAutoFit/>
+          </a:bodyPr>
+          <a:lstStyle/>
+          <a:p>
+            <a:pPr algn="ctr"/>
+            <a:r>
+              <a:rPr lang="fr-FR" sz="9600" b="1" dirty="0" err="1" smtClean="0">
+                <a:effectLst>
+                  <a:outerShdw blurRad="38100" dist="38100" dir="2700000" algn="tl">
+                    <a:srgbClr val="000000">
+                      <a:alpha val="43137"/>
+                    </a:srgbClr>
+                  </a:outerShdw>
+                </a:effectLst>
+                <a:latin typeface="Bodoni MT" panose="02070603080606020203" pitchFamily="18" charset="0"/>
+              </a:rPr>
+              <a:t>Tily</a:t>
+            </a:r>
+            <a:r>
+              <a:rPr lang="fr-FR" sz="9600" b="1" dirty="0" smtClean="0">
+                <a:effectLst>
+                  <a:outerShdw blurRad="38100" dist="38100" dir="2700000" algn="tl">
+                    <a:srgbClr val="000000">
+                      <a:alpha val="43137"/>
+                    </a:srgbClr>
+                  </a:outerShdw>
+                </a:effectLst>
+                <a:latin typeface="Bodoni MT" panose="02070603080606020203" pitchFamily="18" charset="0"/>
+              </a:rPr>
+              <a:t> </a:t>
+            </a:r>
+            <a:r>
+              <a:rPr lang="fr-FR" sz="9600" b="1" dirty="0" err="1" smtClean="0">
+                <a:effectLst>
+                  <a:outerShdw blurRad="38100" dist="38100" dir="2700000" algn="tl">
+                    <a:srgbClr val="000000">
+                      <a:alpha val="43137"/>
+                    </a:srgbClr>
+                  </a:outerShdw>
+                </a:effectLst>
+                <a:latin typeface="Bodoni MT" panose="02070603080606020203" pitchFamily="18" charset="0"/>
+              </a:rPr>
+              <a:t>indray</a:t>
+            </a:r>
+            <a:r>
+              <a:rPr lang="fr-FR" sz="9600" b="1" dirty="0" smtClean="0">
+                <a:effectLst>
+                  <a:outerShdw blurRad="38100" dist="38100" dir="2700000" algn="tl">
+                    <a:srgbClr val="000000">
+                      <a:alpha val="43137"/>
+                    </a:srgbClr>
+                  </a:outerShdw>
+                </a:effectLst>
+                <a:latin typeface="Bodoni MT" panose="02070603080606020203" pitchFamily="18" charset="0"/>
+              </a:rPr>
+              <a:t> </a:t>
+            </a:r>
+            <a:r>
+              <a:rPr lang="fr-FR" sz="9600" b="1" dirty="0" err="1" smtClean="0">
+                <a:effectLst>
+                  <a:outerShdw blurRad="38100" dist="38100" dir="2700000" algn="tl">
+                    <a:srgbClr val="000000">
+                      <a:alpha val="43137"/>
+                    </a:srgbClr>
+                  </a:outerShdw>
+                </a:effectLst>
+                <a:latin typeface="Bodoni MT" panose="02070603080606020203" pitchFamily="18" charset="0"/>
+              </a:rPr>
+              <a:t>andro</a:t>
+            </a:r>
+            <a:r>
+              <a:rPr lang="fr-FR" sz="9600" b="1" dirty="0" smtClean="0">
+                <a:effectLst>
+                  <a:outerShdw blurRad="38100" dist="38100" dir="2700000" algn="tl">
+                    <a:srgbClr val="000000">
+                      <a:alpha val="43137"/>
+                    </a:srgbClr>
+                  </a:outerShdw>
+                </a:effectLst>
+                <a:latin typeface="Bodoni MT" panose="02070603080606020203" pitchFamily="18" charset="0"/>
+              </a:rPr>
+              <a:t> ho </a:t>
+            </a:r>
+            <a:r>
+              <a:rPr lang="fr-FR" sz="9600" b="1" dirty="0" err="1" smtClean="0">
+                <a:effectLst>
+                  <a:outerShdw blurRad="38100" dist="38100" dir="2700000" algn="tl">
+                    <a:srgbClr val="000000">
+                      <a:alpha val="43137"/>
+                    </a:srgbClr>
+                  </a:outerShdw>
+                </a:effectLst>
+                <a:latin typeface="Bodoni MT" panose="02070603080606020203" pitchFamily="18" charset="0"/>
+              </a:rPr>
+              <a:t>mandrakizay</a:t>
+            </a:r>
+            <a:r>
+              <a:rPr lang="fr-FR" sz="9600" b="1" dirty="0" smtClean="0">
+                <a:effectLst>
+                  <a:outerShdw blurRad="38100" dist="38100" dir="2700000" algn="tl">
+                    <a:srgbClr val="000000">
+                      <a:alpha val="43137"/>
+                    </a:srgbClr>
+                  </a:outerShdw>
+                </a:effectLst>
+                <a:latin typeface="Bodoni MT" panose="02070603080606020203" pitchFamily="18" charset="0"/>
+              </a:rPr>
+              <a:t> </a:t>
+            </a:r>
+          </a:p>
+          <a:p>
+            <a:pPr algn="ctr"/>
+            <a:r>
+              <a:rPr lang="fr-FR" sz="9600" b="1" dirty="0" err="1" smtClean="0">
+                <a:effectLst>
+                  <a:outerShdw blurRad="38100" dist="38100" dir="2700000" algn="tl">
+                    <a:srgbClr val="000000">
+                      <a:alpha val="43137"/>
+                    </a:srgbClr>
+                  </a:outerShdw>
+                </a:effectLst>
+                <a:latin typeface="Bodoni MT" panose="02070603080606020203" pitchFamily="18" charset="0"/>
+              </a:rPr>
+              <a:t>Mitombo</a:t>
+            </a:r>
+            <a:r>
+              <a:rPr lang="fr-FR" sz="9600" b="1" dirty="0" smtClean="0">
+                <a:effectLst>
+                  <a:outerShdw blurRad="38100" dist="38100" dir="2700000" algn="tl">
+                    <a:srgbClr val="000000">
+                      <a:alpha val="43137"/>
+                    </a:srgbClr>
+                  </a:outerShdw>
+                </a:effectLst>
+                <a:latin typeface="Bodoni MT" panose="02070603080606020203" pitchFamily="18" charset="0"/>
+              </a:rPr>
+              <a:t> </a:t>
+            </a:r>
+            <a:r>
+              <a:rPr lang="fr-FR" sz="9600" b="1" dirty="0" err="1" smtClean="0">
+                <a:effectLst>
+                  <a:outerShdw blurRad="38100" dist="38100" dir="2700000" algn="tl">
+                    <a:srgbClr val="000000">
+                      <a:alpha val="43137"/>
+                    </a:srgbClr>
+                  </a:outerShdw>
+                </a:effectLst>
+                <a:latin typeface="Bodoni MT" panose="02070603080606020203" pitchFamily="18" charset="0"/>
+              </a:rPr>
+              <a:t>isanandro</a:t>
+            </a:r>
+            <a:r>
+              <a:rPr lang="fr-FR" sz="9600" b="1" dirty="0" smtClean="0">
+                <a:effectLst>
+                  <a:outerShdw blurRad="38100" dist="38100" dir="2700000" algn="tl">
+                    <a:srgbClr val="000000">
+                      <a:alpha val="43137"/>
+                    </a:srgbClr>
+                  </a:outerShdw>
+                </a:effectLst>
+                <a:latin typeface="Bodoni MT" panose="02070603080606020203" pitchFamily="18" charset="0"/>
+              </a:rPr>
+              <a:t> </a:t>
+            </a:r>
+          </a:p>
+          <a:p>
+            <a:pPr algn="ctr"/>
+            <a:r>
+              <a:rPr lang="fr-FR" sz="9600" b="1" dirty="0" err="1" smtClean="0">
+                <a:effectLst>
+                  <a:outerShdw blurRad="38100" dist="38100" dir="2700000" algn="tl">
+                    <a:srgbClr val="000000">
+                      <a:alpha val="43137"/>
+                    </a:srgbClr>
+                  </a:outerShdw>
+                </a:effectLst>
+                <a:latin typeface="Bodoni MT" panose="02070603080606020203" pitchFamily="18" charset="0"/>
+              </a:rPr>
+              <a:t>ny</a:t>
+            </a:r>
+            <a:r>
+              <a:rPr lang="fr-FR" sz="9600" b="1" dirty="0" smtClean="0">
+                <a:effectLst>
+                  <a:outerShdw blurRad="38100" dist="38100" dir="2700000" algn="tl">
+                    <a:srgbClr val="000000">
+                      <a:alpha val="43137"/>
+                    </a:srgbClr>
+                  </a:outerShdw>
+                </a:effectLst>
+                <a:latin typeface="Bodoni MT" panose="02070603080606020203" pitchFamily="18" charset="0"/>
+              </a:rPr>
+              <a:t> </a:t>
+            </a:r>
+            <a:r>
+              <a:rPr lang="fr-FR" sz="9600" b="1" dirty="0" err="1" smtClean="0">
+                <a:effectLst>
+                  <a:outerShdw blurRad="38100" dist="38100" dir="2700000" algn="tl">
+                    <a:srgbClr val="000000">
+                      <a:alpha val="43137"/>
+                    </a:srgbClr>
+                  </a:outerShdw>
+                </a:effectLst>
+                <a:latin typeface="Bodoni MT" panose="02070603080606020203" pitchFamily="18" charset="0"/>
+              </a:rPr>
+              <a:t>isanay</a:t>
+            </a:r>
+            <a:r>
+              <a:rPr lang="fr-FR" sz="9600" b="1" dirty="0" smtClean="0">
+                <a:effectLst>
+                  <a:outerShdw blurRad="38100" dist="38100" dir="2700000" algn="tl">
+                    <a:srgbClr val="000000">
+                      <a:alpha val="43137"/>
+                    </a:srgbClr>
+                  </a:outerShdw>
+                </a:effectLst>
+                <a:latin typeface="Bodoni MT" panose="02070603080606020203" pitchFamily="18" charset="0"/>
+              </a:rPr>
+              <a:t> </a:t>
+            </a:r>
+            <a:r>
+              <a:rPr lang="fr-FR" sz="9600" b="1" dirty="0" err="1" smtClean="0">
+                <a:effectLst>
+                  <a:outerShdw blurRad="38100" dist="38100" dir="2700000" algn="tl">
+                    <a:srgbClr val="000000">
+                      <a:alpha val="43137"/>
+                    </a:srgbClr>
+                  </a:outerShdw>
+                </a:effectLst>
+                <a:latin typeface="Bodoni MT" panose="02070603080606020203" pitchFamily="18" charset="0"/>
+              </a:rPr>
+              <a:t>ry</a:t>
+            </a:r>
+            <a:r>
+              <a:rPr lang="fr-FR" sz="9600" b="1" dirty="0" smtClean="0">
+                <a:effectLst>
+                  <a:outerShdw blurRad="38100" dist="38100" dir="2700000" algn="tl">
+                    <a:srgbClr val="000000">
+                      <a:alpha val="43137"/>
+                    </a:srgbClr>
+                  </a:outerShdw>
+                </a:effectLst>
+                <a:latin typeface="Bodoni MT" panose="02070603080606020203" pitchFamily="18" charset="0"/>
+              </a:rPr>
+              <a:t> Ray</a:t>
+            </a:r>
+          </a:p>
+        </p:txBody>
+      </p:sp>
+    </p:spTree>
+    <p:extLst>
+      <p:ext uri="{BB962C8B-B14F-4D97-AF65-F5344CB8AC3E}">
+        <p14:creationId xmlns:p14="http://schemas.microsoft.com/office/powerpoint/2010/main" val="3219080305"/>
+      </p:ext>
+    </p:extLst>
+  </p:cSld>
+  <p:clrMapOvr>
+    <a:masterClrMapping/>
+  </p:clrMapOvr>
+</p:sld>
+</file>
+
+<file path=ppt/slides/slide15.xml><?xml version="1.0" encoding="utf-8"?>
+<p:sld xmlns:a="http://schemas.openxmlformats.org/drawingml/2006/main" xmlns:r="http://schemas.openxmlformats.org/officeDocument/2006/relationships" xmlns:p="http://schemas.openxmlformats.org/presentationml/2006/main">
+  <p:cSld>
+    <p:spTree>
+      <p:nvGrpSpPr>
+        <p:cNvPr id="1" name=""/>
+        <p:cNvGrpSpPr/>
+        <p:nvPr/>
+      </p:nvGrpSpPr>
+      <p:grpSpPr>
+        <a:xfrm>
+          <a:off x="0" y="0"/>
+          <a:ext cx="0" cy="0"/>
+          <a:chOff x="0" y="0"/>
+          <a:chExt cx="0" cy="0"/>
+        </a:xfrm>
+      </p:grpSpPr>
+      <p:sp>
+        <p:nvSpPr>
+          <p:cNvPr id="2" name="Rectangle 1"/>
+          <p:cNvSpPr/>
+          <p:nvPr/>
+        </p:nvSpPr>
+        <p:spPr>
+          <a:xfrm>
+            <a:off x="0" y="218367"/>
+            <a:ext cx="12192000" cy="6001643"/>
+          </a:xfrm>
+          <a:prstGeom prst="rect">
+            <a:avLst/>
+          </a:prstGeom>
+        </p:spPr>
+        <p:txBody>
+          <a:bodyPr wrap="square">
+            <a:spAutoFit/>
+          </a:bodyPr>
+          <a:lstStyle/>
+          <a:p>
+            <a:pPr algn="ctr"/>
+            <a:r>
+              <a:rPr lang="fr-FR" sz="9600" b="1" dirty="0" err="1" smtClean="0">
+                <a:effectLst>
+                  <a:outerShdw blurRad="38100" dist="38100" dir="2700000" algn="tl">
+                    <a:srgbClr val="000000">
+                      <a:alpha val="43137"/>
+                    </a:srgbClr>
+                  </a:outerShdw>
+                </a:effectLst>
+                <a:latin typeface="Bodoni MT" panose="02070603080606020203" pitchFamily="18" charset="0"/>
+              </a:rPr>
+              <a:t>Koa</a:t>
+            </a:r>
+            <a:r>
+              <a:rPr lang="fr-FR" sz="9600" b="1" dirty="0" smtClean="0">
+                <a:effectLst>
+                  <a:outerShdw blurRad="38100" dist="38100" dir="2700000" algn="tl">
+                    <a:srgbClr val="000000">
+                      <a:alpha val="43137"/>
+                    </a:srgbClr>
+                  </a:outerShdw>
+                </a:effectLst>
+                <a:latin typeface="Bodoni MT" panose="02070603080606020203" pitchFamily="18" charset="0"/>
+              </a:rPr>
+              <a:t> </a:t>
+            </a:r>
+            <a:r>
+              <a:rPr lang="fr-FR" sz="9600" b="1" dirty="0" err="1" smtClean="0">
+                <a:effectLst>
+                  <a:outerShdw blurRad="38100" dist="38100" dir="2700000" algn="tl">
+                    <a:srgbClr val="000000">
+                      <a:alpha val="43137"/>
+                    </a:srgbClr>
+                  </a:outerShdw>
+                </a:effectLst>
+                <a:latin typeface="Bodoni MT" panose="02070603080606020203" pitchFamily="18" charset="0"/>
+              </a:rPr>
+              <a:t>tantanonao</a:t>
+            </a:r>
+            <a:r>
+              <a:rPr lang="fr-FR" sz="9600" b="1" dirty="0" smtClean="0">
+                <a:effectLst>
+                  <a:outerShdw blurRad="38100" dist="38100" dir="2700000" algn="tl">
+                    <a:srgbClr val="000000">
+                      <a:alpha val="43137"/>
+                    </a:srgbClr>
+                  </a:outerShdw>
+                </a:effectLst>
+                <a:latin typeface="Bodoni MT" panose="02070603080606020203" pitchFamily="18" charset="0"/>
+              </a:rPr>
+              <a:t>, </a:t>
+            </a:r>
+            <a:r>
+              <a:rPr lang="fr-FR" sz="9600" b="1" dirty="0" err="1" smtClean="0">
+                <a:effectLst>
+                  <a:outerShdw blurRad="38100" dist="38100" dir="2700000" algn="tl">
+                    <a:srgbClr val="000000">
+                      <a:alpha val="43137"/>
+                    </a:srgbClr>
+                  </a:outerShdw>
+                </a:effectLst>
+                <a:latin typeface="Bodoni MT" panose="02070603080606020203" pitchFamily="18" charset="0"/>
+              </a:rPr>
+              <a:t>arovinao</a:t>
+            </a:r>
+            <a:r>
+              <a:rPr lang="fr-FR" sz="9600" b="1" dirty="0" smtClean="0">
+                <a:effectLst>
+                  <a:outerShdw blurRad="38100" dist="38100" dir="2700000" algn="tl">
+                    <a:srgbClr val="000000">
+                      <a:alpha val="43137"/>
+                    </a:srgbClr>
+                  </a:outerShdw>
+                </a:effectLst>
+                <a:latin typeface="Bodoni MT" panose="02070603080606020203" pitchFamily="18" charset="0"/>
+              </a:rPr>
+              <a:t> </a:t>
+            </a:r>
+            <a:r>
+              <a:rPr lang="fr-FR" sz="9600" b="1" dirty="0" err="1" smtClean="0">
+                <a:effectLst>
+                  <a:outerShdw blurRad="38100" dist="38100" dir="2700000" algn="tl">
+                    <a:srgbClr val="000000">
+                      <a:alpha val="43137"/>
+                    </a:srgbClr>
+                  </a:outerShdw>
+                </a:effectLst>
+                <a:latin typeface="Bodoni MT" panose="02070603080606020203" pitchFamily="18" charset="0"/>
+              </a:rPr>
+              <a:t>ny</a:t>
+            </a:r>
+            <a:r>
+              <a:rPr lang="fr-FR" sz="9600" b="1" dirty="0" smtClean="0">
+                <a:effectLst>
+                  <a:outerShdw blurRad="38100" dist="38100" dir="2700000" algn="tl">
+                    <a:srgbClr val="000000">
+                      <a:alpha val="43137"/>
+                    </a:srgbClr>
+                  </a:outerShdw>
+                </a:effectLst>
+                <a:latin typeface="Bodoni MT" panose="02070603080606020203" pitchFamily="18" charset="0"/>
+              </a:rPr>
+              <a:t> dia</a:t>
+            </a:r>
+          </a:p>
+          <a:p>
+            <a:pPr algn="ctr"/>
+            <a:r>
+              <a:rPr lang="fr-FR" sz="9600" b="1" dirty="0" err="1" smtClean="0">
+                <a:effectLst>
+                  <a:outerShdw blurRad="38100" dist="38100" dir="2700000" algn="tl">
+                    <a:srgbClr val="000000">
+                      <a:alpha val="43137"/>
+                    </a:srgbClr>
+                  </a:outerShdw>
+                </a:effectLst>
+                <a:latin typeface="Bodoni MT" panose="02070603080606020203" pitchFamily="18" charset="0"/>
+              </a:rPr>
+              <a:t>Arovinao</a:t>
+            </a:r>
+            <a:r>
+              <a:rPr lang="fr-FR" sz="9600" b="1" dirty="0" smtClean="0">
+                <a:effectLst>
+                  <a:outerShdw blurRad="38100" dist="38100" dir="2700000" algn="tl">
+                    <a:srgbClr val="000000">
+                      <a:alpha val="43137"/>
+                    </a:srgbClr>
+                  </a:outerShdw>
+                </a:effectLst>
+                <a:latin typeface="Bodoni MT" panose="02070603080606020203" pitchFamily="18" charset="0"/>
+              </a:rPr>
+              <a:t> </a:t>
+            </a:r>
+            <a:r>
+              <a:rPr lang="fr-FR" sz="9600" b="1" dirty="0" err="1" smtClean="0">
+                <a:effectLst>
+                  <a:outerShdw blurRad="38100" dist="38100" dir="2700000" algn="tl">
+                    <a:srgbClr val="000000">
+                      <a:alpha val="43137"/>
+                    </a:srgbClr>
+                  </a:outerShdw>
+                </a:effectLst>
+                <a:latin typeface="Bodoni MT" panose="02070603080606020203" pitchFamily="18" charset="0"/>
+              </a:rPr>
+              <a:t>izahay</a:t>
+            </a:r>
+            <a:r>
+              <a:rPr lang="fr-FR" sz="9600" b="1" dirty="0" smtClean="0">
+                <a:effectLst>
+                  <a:outerShdw blurRad="38100" dist="38100" dir="2700000" algn="tl">
+                    <a:srgbClr val="000000">
+                      <a:alpha val="43137"/>
+                    </a:srgbClr>
+                  </a:outerShdw>
+                </a:effectLst>
+                <a:latin typeface="Bodoni MT" panose="02070603080606020203" pitchFamily="18" charset="0"/>
+              </a:rPr>
+              <a:t> </a:t>
+            </a:r>
+            <a:r>
+              <a:rPr lang="fr-FR" sz="9600" b="1" dirty="0" err="1" smtClean="0">
+                <a:effectLst>
+                  <a:outerShdw blurRad="38100" dist="38100" dir="2700000" algn="tl">
+                    <a:srgbClr val="000000">
+                      <a:alpha val="43137"/>
+                    </a:srgbClr>
+                  </a:outerShdw>
+                </a:effectLst>
+                <a:latin typeface="Bodoni MT" panose="02070603080606020203" pitchFamily="18" charset="0"/>
+              </a:rPr>
+              <a:t>Jesoa</a:t>
+            </a:r>
+            <a:r>
+              <a:rPr lang="fr-FR" sz="9600" b="1" dirty="0" smtClean="0">
+                <a:effectLst>
+                  <a:outerShdw blurRad="38100" dist="38100" dir="2700000" algn="tl">
+                    <a:srgbClr val="000000">
+                      <a:alpha val="43137"/>
+                    </a:srgbClr>
+                  </a:outerShdw>
+                </a:effectLst>
+                <a:latin typeface="Bodoni MT" panose="02070603080606020203" pitchFamily="18" charset="0"/>
+              </a:rPr>
+              <a:t> </a:t>
+            </a:r>
+            <a:r>
+              <a:rPr lang="fr-FR" sz="9600" b="1" dirty="0" err="1" smtClean="0">
+                <a:effectLst>
+                  <a:outerShdw blurRad="38100" dist="38100" dir="2700000" algn="tl">
+                    <a:srgbClr val="000000">
+                      <a:alpha val="43137"/>
+                    </a:srgbClr>
+                  </a:outerShdw>
+                </a:effectLst>
+                <a:latin typeface="Bodoni MT" panose="02070603080606020203" pitchFamily="18" charset="0"/>
+              </a:rPr>
+              <a:t>zoky</a:t>
+            </a:r>
+            <a:r>
+              <a:rPr lang="fr-FR" sz="9600" b="1" dirty="0" smtClean="0">
+                <a:effectLst>
+                  <a:outerShdw blurRad="38100" dist="38100" dir="2700000" algn="tl">
+                    <a:srgbClr val="000000">
+                      <a:alpha val="43137"/>
+                    </a:srgbClr>
+                  </a:outerShdw>
+                </a:effectLst>
+                <a:latin typeface="Bodoni MT" panose="02070603080606020203" pitchFamily="18" charset="0"/>
+              </a:rPr>
+              <a:t> </a:t>
+            </a:r>
+            <a:r>
+              <a:rPr lang="fr-FR" sz="9600" b="1" dirty="0" err="1" smtClean="0">
+                <a:effectLst>
+                  <a:outerShdw blurRad="38100" dist="38100" dir="2700000" algn="tl">
+                    <a:srgbClr val="000000">
+                      <a:alpha val="43137"/>
+                    </a:srgbClr>
+                  </a:outerShdw>
+                </a:effectLst>
+                <a:latin typeface="Bodoni MT" panose="02070603080606020203" pitchFamily="18" charset="0"/>
+              </a:rPr>
+              <a:t>tia</a:t>
+            </a:r>
+            <a:endParaRPr lang="fr-FR" sz="9600" b="1" dirty="0">
+              <a:effectLst>
+                <a:outerShdw blurRad="38100" dist="38100" dir="2700000" algn="tl">
+                  <a:srgbClr val="000000">
+                    <a:alpha val="43137"/>
+                  </a:srgbClr>
+                </a:outerShdw>
+              </a:effectLst>
+              <a:latin typeface="Bodoni MT" panose="02070603080606020203" pitchFamily="18" charset="0"/>
+            </a:endParaRPr>
+          </a:p>
+        </p:txBody>
+      </p:sp>
+    </p:spTree>
+    <p:extLst>
+      <p:ext uri="{BB962C8B-B14F-4D97-AF65-F5344CB8AC3E}">
+        <p14:creationId xmlns:p14="http://schemas.microsoft.com/office/powerpoint/2010/main" val="1026977654"/>
+      </p:ext>
+    </p:extLst>
+  </p:cSld>
+  <p:clrMapOvr>
+    <a:masterClrMapping/>
+  </p:clrMapOvr>
+</p:sld>
+</file>
+
 <file path=ppt/slides/slide2.xml><?xml version="1.0" encoding="utf-8"?>
 <p:sld xmlns:a="http://schemas.openxmlformats.org/drawingml/2006/main" xmlns:r="http://schemas.openxmlformats.org/officeDocument/2006/relationships" xmlns:p="http://schemas.openxmlformats.org/presentationml/2006/main">
   <p:cSld>
@@ -5069,6 +5645,13 @@
   <p:clrMapOvr>
     <a:masterClrMapping/>
   </p:clrMapOvr>
+  <p:timing>
+    <p:tnLst>
+      <p:par>
+        <p:cTn id="1" dur="indefinite" restart="never" nodeType="tmRoot"/>
+      </p:par>
+    </p:tnLst>
+  </p:timing>
 </p:sld>
 </file>
 
@@ -5148,7 +5731,7 @@
                 </a:effectLst>
                 <a:latin typeface="Bell MT" panose="02020503060305020303" pitchFamily="18" charset="0"/>
               </a:rPr>
-              <a:t>tantanonao</a:t>
+              <a:t>mandehana</a:t>
             </a:r>
             <a:r>
               <a:rPr lang="fr-FR" sz="9600" b="1" dirty="0" smtClean="0">
@@ -5161,7 +5744,7 @@
                 </a:effectLst>
                 <a:latin typeface="Bell MT" panose="02020503060305020303" pitchFamily="18" charset="0"/>
               </a:rPr>
-              <a:t>, </a:t>
+              <a:t> </a:t>
             </a:r>
             <a:r>
               <a:rPr lang="fr-FR" sz="9600" b="1" dirty="0" err="1" smtClean="0">
@@ -5174,7 +5757,7 @@
                 </a:effectLst>
                 <a:latin typeface="Bell MT" panose="02020503060305020303" pitchFamily="18" charset="0"/>
               </a:rPr>
-              <a:t>arovinao</a:t>
+              <a:t>amin’izao</a:t>
             </a:r>
             <a:r>
               <a:rPr lang="fr-FR" sz="9600" b="1" dirty="0" smtClean="0">
@@ -5200,6 +5783,84 @@
                 </a:effectLst>
                 <a:latin typeface="Bell MT" panose="02020503060305020303" pitchFamily="18" charset="0"/>
               </a:rPr>
+              <a:t>herinao</a:t>
+            </a:r>
+            <a:r>
+              <a:rPr lang="fr-FR" sz="9600" b="1" dirty="0" smtClean="0">
+                <a:effectLst>
+                  <a:outerShdw blurRad="38100" dist="38100" dir="2700000" algn="tl">
+                    <a:srgbClr val="000000">
+                      <a:alpha val="43137"/>
+                    </a:srgbClr>
+                  </a:outerShdw>
+                </a:effectLst>
+                <a:latin typeface="Bell MT" panose="02020503060305020303" pitchFamily="18" charset="0"/>
+              </a:rPr>
+              <a:t> </a:t>
+            </a:r>
+            <a:r>
+              <a:rPr lang="fr-FR" sz="9600" b="1" dirty="0" err="1" smtClean="0">
+                <a:effectLst>
+                  <a:outerShdw blurRad="38100" dist="38100" dir="2700000" algn="tl">
+                    <a:srgbClr val="000000">
+                      <a:alpha val="43137"/>
+                    </a:srgbClr>
+                  </a:outerShdw>
+                </a:effectLst>
+                <a:latin typeface="Bell MT" panose="02020503060305020303" pitchFamily="18" charset="0"/>
+              </a:rPr>
+              <a:t>izao</a:t>
+            </a:r>
+            <a:endParaRPr lang="fr-FR" sz="9600" b="1" dirty="0" smtClean="0">
+              <a:effectLst>
+                <a:outerShdw blurRad="38100" dist="38100" dir="2700000" algn="tl">
+                  <a:srgbClr val="000000">
+                    <a:alpha val="43137"/>
+                  </a:srgbClr>
+                </a:outerShdw>
+              </a:effectLst>
+              <a:latin typeface="Bell MT" panose="02020503060305020303" pitchFamily="18" charset="0"/>
+            </a:endParaRPr>
+          </a:p>
+          <a:p>
+            <a:pPr algn="ctr"/>
+            <a:r>
+              <a:rPr lang="fr-FR" sz="9600" b="1" dirty="0" err="1" smtClean="0">
+                <a:effectLst>
+                  <a:outerShdw blurRad="38100" dist="38100" dir="2700000" algn="tl">
+                    <a:srgbClr val="000000">
+                      <a:alpha val="43137"/>
+                    </a:srgbClr>
+                  </a:outerShdw>
+                </a:effectLst>
+                <a:latin typeface="Bell MT" panose="02020503060305020303" pitchFamily="18" charset="0"/>
+              </a:rPr>
+              <a:t>Tanteraho</a:t>
+            </a:r>
+            <a:r>
+              <a:rPr lang="fr-FR" sz="9600" b="1" dirty="0" smtClean="0">
+                <a:effectLst>
+                  <a:outerShdw blurRad="38100" dist="38100" dir="2700000" algn="tl">
+                    <a:srgbClr val="000000">
+                      <a:alpha val="43137"/>
+                    </a:srgbClr>
+                  </a:outerShdw>
+                </a:effectLst>
+                <a:latin typeface="Bell MT" panose="02020503060305020303" pitchFamily="18" charset="0"/>
+              </a:rPr>
+              <a:t> </a:t>
+            </a:r>
+            <a:r>
+              <a:rPr lang="fr-FR" sz="9600" b="1" dirty="0" err="1" smtClean="0">
+                <a:effectLst>
+                  <a:outerShdw blurRad="38100" dist="38100" dir="2700000" algn="tl">
+                    <a:srgbClr val="000000">
+                      <a:alpha val="43137"/>
+                    </a:srgbClr>
+                  </a:outerShdw>
+                </a:effectLst>
+                <a:latin typeface="Bell MT" panose="02020503060305020303" pitchFamily="18" charset="0"/>
+              </a:rPr>
               <a:t>ny</a:t>
             </a:r>
             <a:r>
@@ -5213,11 +5874,8 @@
                 </a:effectLst>
                 <a:latin typeface="Bell MT" panose="02020503060305020303" pitchFamily="18" charset="0"/>
               </a:rPr>
-              <a:t> dia</a:t>
-            </a:r>
-          </a:p>
-          <a:p>
-            <a:pPr algn="ctr"/>
+              <a:t> </a:t>
+            </a:r>
             <a:r>
               <a:rPr lang="fr-FR" sz="9600" b="1" dirty="0" err="1" smtClean="0">
                 <a:effectLst>
@@ -5229,111 +5887,7 @@
                 </a:effectLst>
                 <a:latin typeface="Bell MT" panose="02020503060305020303" pitchFamily="18" charset="0"/>
               </a:rPr>
-              <a:t>Arovinao</a:t>
-            </a:r>
-            <a:r>
-              <a:rPr lang="fr-FR" sz="9600" b="1" dirty="0" smtClean="0">
-                <a:effectLst>
-                  <a:outerShdw blurRad="38100" dist="38100" dir="2700000" algn="tl">
-                    <a:srgbClr val="000000">
-                      <a:alpha val="43137"/>
-                    </a:srgbClr>
-                  </a:outerShdw>
-                </a:effectLst>
-                <a:latin typeface="Bell MT" panose="02020503060305020303" pitchFamily="18" charset="0"/>
-              </a:rPr>
-              <a:t> </a:t>
-            </a:r>
-            <a:r>
-              <a:rPr lang="fr-FR" sz="9600" b="1" dirty="0" err="1" smtClean="0">
-                <a:effectLst>
-                  <a:outerShdw blurRad="38100" dist="38100" dir="2700000" algn="tl">
-                    <a:srgbClr val="000000">
-                      <a:alpha val="43137"/>
-                    </a:srgbClr>
-                  </a:outerShdw>
-                </a:effectLst>
-                <a:latin typeface="Bell MT" panose="02020503060305020303" pitchFamily="18" charset="0"/>
-              </a:rPr>
-              <a:t>izahay</a:t>
-            </a:r>
-            <a:r>
-              <a:rPr lang="fr-FR" sz="9600" b="1" dirty="0" smtClean="0">
-                <a:effectLst>
-                  <a:outerShdw blurRad="38100" dist="38100" dir="2700000" algn="tl">
-                    <a:srgbClr val="000000">
-                      <a:alpha val="43137"/>
-                    </a:srgbClr>
-                  </a:outerShdw>
-                </a:effectLst>
-                <a:latin typeface="Bell MT" panose="02020503060305020303" pitchFamily="18" charset="0"/>
-              </a:rPr>
-              <a:t> </a:t>
-            </a:r>
-            <a:r>
-              <a:rPr lang="fr-FR" sz="9600" b="1" dirty="0" err="1" smtClean="0">
-                <a:effectLst>
-                  <a:outerShdw blurRad="38100" dist="38100" dir="2700000" algn="tl">
-                    <a:srgbClr val="000000">
-                      <a:alpha val="43137"/>
-                    </a:srgbClr>
-                  </a:outerShdw>
-                </a:effectLst>
-                <a:latin typeface="Bell MT" panose="02020503060305020303" pitchFamily="18" charset="0"/>
-              </a:rPr>
-              <a:t>Jesoa</a:t>
-            </a:r>
-            <a:r>
-              <a:rPr lang="fr-FR" sz="9600" b="1" dirty="0" smtClean="0">
-                <a:effectLst>
-                  <a:outerShdw blurRad="38100" dist="38100" dir="2700000" algn="tl">
-                    <a:srgbClr val="000000">
-                      <a:alpha val="43137"/>
-                    </a:srgbClr>
-                  </a:outerShdw>
-                </a:effectLst>
-                <a:latin typeface="Bell MT" panose="02020503060305020303" pitchFamily="18" charset="0"/>
-              </a:rPr>
-              <a:t> </a:t>
-            </a:r>
-            <a:r>
-              <a:rPr lang="fr-FR" sz="9600" b="1" dirty="0" err="1" smtClean="0">
-                <a:effectLst>
-                  <a:outerShdw blurRad="38100" dist="38100" dir="2700000" algn="tl">
-                    <a:srgbClr val="000000">
-                      <a:alpha val="43137"/>
-                    </a:srgbClr>
-                  </a:outerShdw>
-                </a:effectLst>
-                <a:latin typeface="Bell MT" panose="02020503060305020303" pitchFamily="18" charset="0"/>
-              </a:rPr>
-              <a:t>zoky</a:t>
-            </a:r>
-            <a:r>
-              <a:rPr lang="fr-FR" sz="9600" b="1" dirty="0" smtClean="0">
-                <a:effectLst>
-                  <a:outerShdw blurRad="38100" dist="38100" dir="2700000" algn="tl">
-                    <a:srgbClr val="000000">
-                      <a:alpha val="43137"/>
-                    </a:srgbClr>
-                  </a:outerShdw>
-                </a:effectLst>
-                <a:latin typeface="Bell MT" panose="02020503060305020303" pitchFamily="18" charset="0"/>
-              </a:rPr>
-              <a:t> </a:t>
-            </a:r>
-            <a:r>
-              <a:rPr lang="fr-FR" sz="9600" b="1" dirty="0" err="1" smtClean="0">
-                <a:effectLst>
-                  <a:outerShdw blurRad="38100" dist="38100" dir="2700000" algn="tl">
-                    <a:srgbClr val="000000">
-                      <a:alpha val="43137"/>
-                    </a:srgbClr>
-                  </a:outerShdw>
-                </a:effectLst>
-                <a:latin typeface="Bell MT" panose="02020503060305020303" pitchFamily="18" charset="0"/>
-              </a:rPr>
-              <a:t>tia</a:t>
+              <a:t>fanompoanao</a:t>
             </a:r>
             <a:endParaRPr lang="fr-FR" sz="9600" b="1" dirty="0">
               <a:effectLst>
@@ -5358,6 +5912,13 @@
   <p:clrMapOvr>
     <a:masterClrMapping/>
   </p:clrMapOvr>
+  <p:timing>
+    <p:tnLst>
+      <p:par>
+        <p:cTn id="1" dur="indefinite" restart="never" nodeType="tmRoot"/>
+      </p:par>
+    </p:tnLst>
+  </p:timing>
 </p:sld>
 </file>
 
@@ -5653,6 +6214,13 @@
   <p:clrMapOvr>
     <a:masterClrMapping/>
   </p:clrMapOvr>
+  <p:timing>
+    <p:tnLst>
+      <p:par>
+        <p:cTn id="1" dur="indefinite" restart="never" nodeType="tmRoot"/>
+      </p:par>
+    </p:tnLst>
+  </p:timing>
 </p:sld>
 </file>
 
@@ -5942,6 +6510,13 @@
   <p:clrMapOvr>
     <a:masterClrMapping/>
   </p:clrMapOvr>
+  <p:timing>
+    <p:tnLst>
+      <p:par>
+        <p:cTn id="1" dur="indefinite" restart="never" nodeType="tmRoot"/>
+      </p:par>
+    </p:tnLst>
+  </p:timing>
 </p:sld>
 </file>
 
@@ -6474,6 +7049,13 @@
   <p:clrMapOvr>
     <a:masterClrMapping/>
   </p:clrMapOvr>
+  <p:timing>
+    <p:tnLst>
+      <p:par>
+        <p:cTn id="1" dur="indefinite" restart="never" nodeType="tmRoot"/>
+      </p:par>
+    </p:tnLst>
+  </p:timing>
 </p:sld>
 </file>
 
@@ -6553,7 +7135,7 @@
                 </a:effectLst>
                 <a:latin typeface="Bell MT" panose="02020503060305020303" pitchFamily="18" charset="0"/>
               </a:rPr>
-              <a:t>tantanonao</a:t>
+              <a:t>mandehana</a:t>
             </a:r>
             <a:r>
               <a:rPr lang="fr-FR" sz="9600" b="1" dirty="0" smtClean="0">
@@ -6566,7 +7148,7 @@
                 </a:effectLst>
                 <a:latin typeface="Bell MT" panose="02020503060305020303" pitchFamily="18" charset="0"/>
               </a:rPr>
-              <a:t>, </a:t>
+              <a:t> </a:t>
             </a:r>
             <a:r>
               <a:rPr lang="fr-FR" sz="9600" b="1" dirty="0" err="1" smtClean="0">
@@ -6579,7 +7161,7 @@
                 </a:effectLst>
                 <a:latin typeface="Bell MT" panose="02020503060305020303" pitchFamily="18" charset="0"/>
               </a:rPr>
-              <a:t>arovinao</a:t>
+              <a:t>amin’izao</a:t>
             </a:r>
             <a:r>
               <a:rPr lang="fr-FR" sz="9600" b="1" dirty="0" smtClean="0">
@@ -6605,6 +7187,84 @@
                 </a:effectLst>
                 <a:latin typeface="Bell MT" panose="02020503060305020303" pitchFamily="18" charset="0"/>
               </a:rPr>
+              <a:t>herinao</a:t>
+            </a:r>
+            <a:r>
+              <a:rPr lang="fr-FR" sz="9600" b="1" dirty="0" smtClean="0">
+                <a:effectLst>
+                  <a:outerShdw blurRad="38100" dist="38100" dir="2700000" algn="tl">
+                    <a:srgbClr val="000000">
+                      <a:alpha val="43137"/>
+                    </a:srgbClr>
+                  </a:outerShdw>
+                </a:effectLst>
+                <a:latin typeface="Bell MT" panose="02020503060305020303" pitchFamily="18" charset="0"/>
+              </a:rPr>
+              <a:t> </a:t>
+            </a:r>
+            <a:r>
+              <a:rPr lang="fr-FR" sz="9600" b="1" dirty="0" err="1" smtClean="0">
+                <a:effectLst>
+                  <a:outerShdw blurRad="38100" dist="38100" dir="2700000" algn="tl">
+                    <a:srgbClr val="000000">
+                      <a:alpha val="43137"/>
+                    </a:srgbClr>
+                  </a:outerShdw>
+                </a:effectLst>
+                <a:latin typeface="Bell MT" panose="02020503060305020303" pitchFamily="18" charset="0"/>
+              </a:rPr>
+              <a:t>izao</a:t>
+            </a:r>
+            <a:endParaRPr lang="fr-FR" sz="9600" b="1" dirty="0" smtClean="0">
+              <a:effectLst>
+                <a:outerShdw blurRad="38100" dist="38100" dir="2700000" algn="tl">
+                  <a:srgbClr val="000000">
+                    <a:alpha val="43137"/>
+                  </a:srgbClr>
+                </a:outerShdw>
+              </a:effectLst>
+              <a:latin typeface="Bell MT" panose="02020503060305020303" pitchFamily="18" charset="0"/>
+            </a:endParaRPr>
+          </a:p>
+          <a:p>
+            <a:pPr algn="ctr"/>
+            <a:r>
+              <a:rPr lang="fr-FR" sz="9600" b="1" dirty="0" err="1" smtClean="0">
+                <a:effectLst>
+                  <a:outerShdw blurRad="38100" dist="38100" dir="2700000" algn="tl">
+                    <a:srgbClr val="000000">
+                      <a:alpha val="43137"/>
+                    </a:srgbClr>
+                  </a:outerShdw>
+                </a:effectLst>
+                <a:latin typeface="Bell MT" panose="02020503060305020303" pitchFamily="18" charset="0"/>
+              </a:rPr>
+              <a:t>Tanteraho</a:t>
+            </a:r>
+            <a:r>
+              <a:rPr lang="fr-FR" sz="9600" b="1" dirty="0" smtClean="0">
+                <a:effectLst>
+                  <a:outerShdw blurRad="38100" dist="38100" dir="2700000" algn="tl">
+                    <a:srgbClr val="000000">
+                      <a:alpha val="43137"/>
+                    </a:srgbClr>
+                  </a:outerShdw>
+                </a:effectLst>
+                <a:latin typeface="Bell MT" panose="02020503060305020303" pitchFamily="18" charset="0"/>
+              </a:rPr>
+              <a:t> </a:t>
+            </a:r>
+            <a:r>
+              <a:rPr lang="fr-FR" sz="9600" b="1" dirty="0" err="1" smtClean="0">
+                <a:effectLst>
+                  <a:outerShdw blurRad="38100" dist="38100" dir="2700000" algn="tl">
+                    <a:srgbClr val="000000">
+                      <a:alpha val="43137"/>
+                    </a:srgbClr>
+                  </a:outerShdw>
+                </a:effectLst>
+                <a:latin typeface="Bell MT" panose="02020503060305020303" pitchFamily="18" charset="0"/>
+              </a:rPr>
               <a:t>ny</a:t>
             </a:r>
             <a:r>
@@ -6618,11 +7278,8 @@
                 </a:effectLst>
                 <a:latin typeface="Bell MT" panose="02020503060305020303" pitchFamily="18" charset="0"/>
               </a:rPr>
-              <a:t> dia</a:t>
-            </a:r>
-          </a:p>
-          <a:p>
-            <a:pPr algn="ctr"/>
+              <a:t> </a:t>
+            </a:r>
             <a:r>
               <a:rPr lang="fr-FR" sz="9600" b="1" dirty="0" err="1" smtClean="0">
                 <a:effectLst>
@@ -6634,111 +7291,7 @@
                 </a:effectLst>
                 <a:latin typeface="Bell MT" panose="02020503060305020303" pitchFamily="18" charset="0"/>
               </a:rPr>
-              <a:t>Arovinao</a:t>
-            </a:r>
-            <a:r>
-              <a:rPr lang="fr-FR" sz="9600" b="1" dirty="0" smtClean="0">
-                <a:effectLst>
-                  <a:outerShdw blurRad="38100" dist="38100" dir="2700000" algn="tl">
-                    <a:srgbClr val="000000">
-                      <a:alpha val="43137"/>
-                    </a:srgbClr>
-                  </a:outerShdw>
-                </a:effectLst>
-                <a:latin typeface="Bell MT" panose="02020503060305020303" pitchFamily="18" charset="0"/>
-              </a:rPr>
-              <a:t> </a:t>
-            </a:r>
-            <a:r>
-              <a:rPr lang="fr-FR" sz="9600" b="1" dirty="0" err="1" smtClean="0">
-                <a:effectLst>
-                  <a:outerShdw blurRad="38100" dist="38100" dir="2700000" algn="tl">
-                    <a:srgbClr val="000000">
-                      <a:alpha val="43137"/>
-                    </a:srgbClr>
-                  </a:outerShdw>
-                </a:effectLst>
-                <a:latin typeface="Bell MT" panose="02020503060305020303" pitchFamily="18" charset="0"/>
-              </a:rPr>
-              <a:t>izahay</a:t>
-            </a:r>
-            <a:r>
-              <a:rPr lang="fr-FR" sz="9600" b="1" dirty="0" smtClean="0">
-                <a:effectLst>
-                  <a:outerShdw blurRad="38100" dist="38100" dir="2700000" algn="tl">
-                    <a:srgbClr val="000000">
-                      <a:alpha val="43137"/>
-                    </a:srgbClr>
-                  </a:outerShdw>
-                </a:effectLst>
-                <a:latin typeface="Bell MT" panose="02020503060305020303" pitchFamily="18" charset="0"/>
-              </a:rPr>
-              <a:t> </a:t>
-            </a:r>
-            <a:r>
-              <a:rPr lang="fr-FR" sz="9600" b="1" dirty="0" err="1" smtClean="0">
-                <a:effectLst>
-                  <a:outerShdw blurRad="38100" dist="38100" dir="2700000" algn="tl">
-                    <a:srgbClr val="000000">
-                      <a:alpha val="43137"/>
-                    </a:srgbClr>
-                  </a:outerShdw>
-                </a:effectLst>
-                <a:latin typeface="Bell MT" panose="02020503060305020303" pitchFamily="18" charset="0"/>
-              </a:rPr>
-              <a:t>Jesoa</a:t>
-            </a:r>
-            <a:r>
-              <a:rPr lang="fr-FR" sz="9600" b="1" dirty="0" smtClean="0">
-                <a:effectLst>
-                  <a:outerShdw blurRad="38100" dist="38100" dir="2700000" algn="tl">
-                    <a:srgbClr val="000000">
-                      <a:alpha val="43137"/>
-                    </a:srgbClr>
-                  </a:outerShdw>
-                </a:effectLst>
-                <a:latin typeface="Bell MT" panose="02020503060305020303" pitchFamily="18" charset="0"/>
-              </a:rPr>
-              <a:t> </a:t>
-            </a:r>
-            <a:r>
-              <a:rPr lang="fr-FR" sz="9600" b="1" dirty="0" err="1" smtClean="0">
-                <a:effectLst>
-                  <a:outerShdw blurRad="38100" dist="38100" dir="2700000" algn="tl">
-                    <a:srgbClr val="000000">
-                      <a:alpha val="43137"/>
-                    </a:srgbClr>
-                  </a:outerShdw>
-                </a:effectLst>
-                <a:latin typeface="Bell MT" panose="02020503060305020303" pitchFamily="18" charset="0"/>
-              </a:rPr>
-              <a:t>zoky</a:t>
-            </a:r>
-            <a:r>
-              <a:rPr lang="fr-FR" sz="9600" b="1" dirty="0" smtClean="0">
-                <a:effectLst>
-                  <a:outerShdw blurRad="38100" dist="38100" dir="2700000" algn="tl">
-                    <a:srgbClr val="000000">
-                      <a:alpha val="43137"/>
-                    </a:srgbClr>
-                  </a:outerShdw>
-                </a:effectLst>
-                <a:latin typeface="Bell MT" panose="02020503060305020303" pitchFamily="18" charset="0"/>
-              </a:rPr>
-              <a:t> </a:t>
-            </a:r>
-            <a:r>
-              <a:rPr lang="fr-FR" sz="9600" b="1" dirty="0" err="1" smtClean="0">
-                <a:effectLst>
-                  <a:outerShdw blurRad="38100" dist="38100" dir="2700000" algn="tl">
-                    <a:srgbClr val="000000">
-                      <a:alpha val="43137"/>
-                    </a:srgbClr>
-                  </a:outerShdw>
-                </a:effectLst>
-                <a:latin typeface="Bell MT" panose="02020503060305020303" pitchFamily="18" charset="0"/>
-              </a:rPr>
-              <a:t>tia</a:t>
+              <a:t>fanompoanao</a:t>
             </a:r>
             <a:endParaRPr lang="fr-FR" sz="9600" b="1" dirty="0">
               <a:effectLst>
@@ -6756,13 +7309,20 @@
     </p:spTree>
     <p:extLst>
       <p:ext uri="{BB962C8B-B14F-4D97-AF65-F5344CB8AC3E}">
-        <p14:creationId xmlns:p14="http://schemas.microsoft.com/office/powerpoint/2010/main" val="2579982232"/>
+        <p14:creationId xmlns:p14="http://schemas.microsoft.com/office/powerpoint/2010/main" val="542343694"/>
       </p:ext>
     </p:extLst>
   </p:cSld>
   <p:clrMapOvr>
     <a:masterClrMapping/>
   </p:clrMapOvr>
+  <p:timing>
+    <p:tnLst>
+      <p:par>
+        <p:cTn id="1" dur="indefinite" restart="never" nodeType="tmRoot"/>
+      </p:par>
+    </p:tnLst>
+  </p:timing>
 </p:sld>
 </file>
 
@@ -7058,6 +7618,13 @@
   <p:clrMapOvr>
     <a:masterClrMapping/>
   </p:clrMapOvr>
+  <p:timing>
+    <p:tnLst>
+      <p:par>
+        <p:cTn id="1" dur="indefinite" restart="never" nodeType="tmRoot"/>
+      </p:par>
+    </p:tnLst>
+  </p:timing>
 </p:sld>
 </file>
 
@@ -7347,6 +7914,13 @@
   <p:clrMapOvr>
     <a:masterClrMapping/>
   </p:clrMapOvr>
+  <p:timing>
+    <p:tnLst>
+      <p:par>
+        <p:cTn id="1" dur="indefinite" restart="never" nodeType="tmRoot"/>
+      </p:par>
+    </p:tnLst>
+  </p:timing>
 </p:sld>
 </file>
 

</xml_diff>